<commit_message>
Ajout du css et quelque js de la page gallerie
</commit_message>
<xml_diff>
--- a/assets/Maquettes/Maquette_ nos acteurs.pptx
+++ b/assets/Maquettes/Maquette_ nos acteurs.pptx
@@ -104,6 +104,11 @@
       </a:defRPr>
     </a:lvl9pPr>
   </p:defaultTextStyle>
+  <p:extLst>
+    <p:ext uri="{EFAFB233-063F-42B5-8137-9DF3F51BA10A}">
+      <p15:sldGuideLst xmlns:p15="http://schemas.microsoft.com/office/powerpoint/2012/main"/>
+    </p:ext>
+  </p:extLst>
 </p:presentation>
 </file>
 
@@ -149,7 +154,7 @@
           </a:lstStyle>
           <a:p>
             <a:r>
-              <a:rPr lang="fr-FR" smtClean="0"/>
+              <a:rPr lang="fr-FR"/>
               <a:t>Modifiez le style du titre</a:t>
             </a:r>
             <a:endParaRPr lang="en-US" dirty="0"/>
@@ -269,7 +274,7 @@
           </a:lstStyle>
           <a:p>
             <a:r>
-              <a:rPr lang="fr-FR" smtClean="0"/>
+              <a:rPr lang="fr-FR"/>
               <a:t>Modifiez le style des sous-titres du masque</a:t>
             </a:r>
             <a:endParaRPr lang="en-US" dirty="0"/>
@@ -293,7 +298,7 @@
           <a:p>
             <a:fld id="{4AAD347D-5ACD-4C99-B74B-A9C85AD731AF}" type="datetimeFigureOut">
               <a:rPr lang="en-US" dirty="0"/>
-              <a:t>3/1/2024</a:t>
+              <a:t>3/26/2024</a:t>
             </a:fld>
             <a:endParaRPr lang="en-US" dirty="0"/>
           </a:p>
@@ -393,7 +398,7 @@
           </a:lstStyle>
           <a:p>
             <a:r>
-              <a:rPr lang="fr-FR" smtClean="0"/>
+              <a:rPr lang="fr-FR"/>
               <a:t>Modifiez le style du titre</a:t>
             </a:r>
             <a:endParaRPr lang="en-US" dirty="0"/>
@@ -472,7 +477,7 @@
           </a:lstStyle>
           <a:p>
             <a:r>
-              <a:rPr lang="fr-FR" smtClean="0"/>
+              <a:rPr lang="fr-FR"/>
               <a:t>Cliquez sur l'icône pour ajouter une image</a:t>
             </a:r>
             <a:endParaRPr lang="en-US" dirty="0"/>
@@ -540,7 +545,7 @@
           <a:p>
             <a:pPr lvl="0"/>
             <a:r>
-              <a:rPr lang="fr-FR" smtClean="0"/>
+              <a:rPr lang="fr-FR"/>
               <a:t>Modifiez les styles du texte du masque</a:t>
             </a:r>
           </a:p>
@@ -563,7 +568,7 @@
           <a:p>
             <a:fld id="{4509A250-FF31-4206-8172-F9D3106AACB1}" type="datetimeFigureOut">
               <a:rPr lang="en-US" dirty="0"/>
-              <a:t>3/1/2024</a:t>
+              <a:t>3/26/2024</a:t>
             </a:fld>
             <a:endParaRPr lang="en-US" dirty="0"/>
           </a:p>
@@ -661,7 +666,7 @@
           </a:lstStyle>
           <a:p>
             <a:r>
-              <a:rPr lang="fr-FR" smtClean="0"/>
+              <a:rPr lang="fr-FR"/>
               <a:t>Modifiez le style du titre</a:t>
             </a:r>
             <a:endParaRPr lang="en-US" dirty="0"/>
@@ -729,7 +734,7 @@
           <a:p>
             <a:pPr lvl="0"/>
             <a:r>
-              <a:rPr lang="fr-FR" smtClean="0"/>
+              <a:rPr lang="fr-FR"/>
               <a:t>Modifiez les styles du texte du masque</a:t>
             </a:r>
           </a:p>
@@ -752,7 +757,7 @@
           <a:p>
             <a:fld id="{4509A250-FF31-4206-8172-F9D3106AACB1}" type="datetimeFigureOut">
               <a:rPr lang="en-US" dirty="0"/>
-              <a:t>3/1/2024</a:t>
+              <a:t>3/26/2024</a:t>
             </a:fld>
             <a:endParaRPr lang="en-US" dirty="0"/>
           </a:p>
@@ -850,7 +855,7 @@
           </a:lstStyle>
           <a:p>
             <a:r>
-              <a:rPr lang="fr-FR" smtClean="0"/>
+              <a:rPr lang="fr-FR"/>
               <a:t>Modifiez le style du titre</a:t>
             </a:r>
             <a:endParaRPr lang="en-US" dirty="0"/>
@@ -930,7 +935,7 @@
               <a:buNone/>
             </a:pPr>
             <a:r>
-              <a:rPr lang="fr-FR" smtClean="0"/>
+              <a:rPr lang="fr-FR"/>
               <a:t>Modifiez les styles du texte du masque</a:t>
             </a:r>
           </a:p>
@@ -997,7 +1002,7 @@
           <a:p>
             <a:pPr lvl="0"/>
             <a:r>
-              <a:rPr lang="fr-FR" smtClean="0"/>
+              <a:rPr lang="fr-FR"/>
               <a:t>Modifiez les styles du texte du masque</a:t>
             </a:r>
           </a:p>
@@ -1020,7 +1025,7 @@
           <a:p>
             <a:fld id="{4509A250-FF31-4206-8172-F9D3106AACB1}" type="datetimeFigureOut">
               <a:rPr lang="en-US" dirty="0"/>
-              <a:t>3/1/2024</a:t>
+              <a:t>3/26/2024</a:t>
             </a:fld>
             <a:endParaRPr lang="en-US" dirty="0"/>
           </a:p>
@@ -1212,7 +1217,7 @@
           </a:lstStyle>
           <a:p>
             <a:r>
-              <a:rPr lang="fr-FR" smtClean="0"/>
+              <a:rPr lang="fr-FR"/>
               <a:t>Modifiez le style du titre</a:t>
             </a:r>
             <a:endParaRPr lang="en-US" dirty="0"/>
@@ -1333,7 +1338,7 @@
           <a:p>
             <a:pPr lvl="0"/>
             <a:r>
-              <a:rPr lang="fr-FR" smtClean="0"/>
+              <a:rPr lang="fr-FR"/>
               <a:t>Modifiez les styles du texte du masque</a:t>
             </a:r>
           </a:p>
@@ -1356,7 +1361,7 @@
           <a:p>
             <a:fld id="{4509A250-FF31-4206-8172-F9D3106AACB1}" type="datetimeFigureOut">
               <a:rPr lang="en-US" dirty="0"/>
-              <a:t>3/1/2024</a:t>
+              <a:t>3/26/2024</a:t>
             </a:fld>
             <a:endParaRPr lang="en-US" dirty="0"/>
           </a:p>
@@ -1449,7 +1454,7 @@
           </a:lstStyle>
           <a:p>
             <a:r>
-              <a:rPr lang="fr-FR" smtClean="0"/>
+              <a:rPr lang="fr-FR"/>
               <a:t>Modifiez le style du titre</a:t>
             </a:r>
             <a:endParaRPr lang="en-US" dirty="0"/>
@@ -1524,7 +1529,7 @@
           <a:p>
             <a:pPr lvl="0"/>
             <a:r>
-              <a:rPr lang="fr-FR" smtClean="0"/>
+              <a:rPr lang="fr-FR"/>
               <a:t>Modifiez les styles du texte du masque</a:t>
             </a:r>
           </a:p>
@@ -1591,7 +1596,7 @@
           <a:p>
             <a:pPr lvl="0"/>
             <a:r>
-              <a:rPr lang="fr-FR" smtClean="0"/>
+              <a:rPr lang="fr-FR"/>
               <a:t>Modifiez les styles du texte du masque</a:t>
             </a:r>
           </a:p>
@@ -1665,7 +1670,7 @@
           <a:p>
             <a:pPr lvl="0"/>
             <a:r>
-              <a:rPr lang="fr-FR" smtClean="0"/>
+              <a:rPr lang="fr-FR"/>
               <a:t>Modifiez les styles du texte du masque</a:t>
             </a:r>
           </a:p>
@@ -1732,7 +1737,7 @@
           <a:p>
             <a:pPr lvl="0"/>
             <a:r>
-              <a:rPr lang="fr-FR" smtClean="0"/>
+              <a:rPr lang="fr-FR"/>
               <a:t>Modifiez les styles du texte du masque</a:t>
             </a:r>
           </a:p>
@@ -1806,7 +1811,7 @@
           <a:p>
             <a:pPr lvl="0"/>
             <a:r>
-              <a:rPr lang="fr-FR" smtClean="0"/>
+              <a:rPr lang="fr-FR"/>
               <a:t>Modifiez les styles du texte du masque</a:t>
             </a:r>
           </a:p>
@@ -1873,7 +1878,7 @@
           <a:p>
             <a:pPr lvl="0"/>
             <a:r>
-              <a:rPr lang="fr-FR" smtClean="0"/>
+              <a:rPr lang="fr-FR"/>
               <a:t>Modifiez les styles du texte du masque</a:t>
             </a:r>
           </a:p>
@@ -1974,7 +1979,7 @@
           <a:p>
             <a:fld id="{4509A250-FF31-4206-8172-F9D3106AACB1}" type="datetimeFigureOut">
               <a:rPr lang="en-US" dirty="0"/>
-              <a:t>3/1/2024</a:t>
+              <a:t>3/26/2024</a:t>
             </a:fld>
             <a:endParaRPr lang="en-US" dirty="0"/>
           </a:p>
@@ -2067,7 +2072,7 @@
           </a:lstStyle>
           <a:p>
             <a:r>
-              <a:rPr lang="fr-FR" smtClean="0"/>
+              <a:rPr lang="fr-FR"/>
               <a:t>Modifiez le style du titre</a:t>
             </a:r>
             <a:endParaRPr lang="en-US" dirty="0"/>
@@ -2142,7 +2147,7 @@
           <a:p>
             <a:pPr lvl="0"/>
             <a:r>
-              <a:rPr lang="fr-FR" smtClean="0"/>
+              <a:rPr lang="fr-FR"/>
               <a:t>Modifiez les styles du texte du masque</a:t>
             </a:r>
           </a:p>
@@ -2220,7 +2225,7 @@
           </a:lstStyle>
           <a:p>
             <a:r>
-              <a:rPr lang="fr-FR" smtClean="0"/>
+              <a:rPr lang="fr-FR"/>
               <a:t>Cliquez sur l'icône pour ajouter une image</a:t>
             </a:r>
             <a:endParaRPr lang="en-US" dirty="0"/>
@@ -2288,7 +2293,7 @@
           <a:p>
             <a:pPr lvl="0"/>
             <a:r>
-              <a:rPr lang="fr-FR" smtClean="0"/>
+              <a:rPr lang="fr-FR"/>
               <a:t>Modifiez les styles du texte du masque</a:t>
             </a:r>
           </a:p>
@@ -2362,7 +2367,7 @@
           <a:p>
             <a:pPr lvl="0"/>
             <a:r>
-              <a:rPr lang="fr-FR" smtClean="0"/>
+              <a:rPr lang="fr-FR"/>
               <a:t>Modifiez les styles du texte du masque</a:t>
             </a:r>
           </a:p>
@@ -2440,7 +2445,7 @@
           </a:lstStyle>
           <a:p>
             <a:r>
-              <a:rPr lang="fr-FR" smtClean="0"/>
+              <a:rPr lang="fr-FR"/>
               <a:t>Cliquez sur l'icône pour ajouter une image</a:t>
             </a:r>
             <a:endParaRPr lang="en-US" dirty="0"/>
@@ -2508,7 +2513,7 @@
           <a:p>
             <a:pPr lvl="0"/>
             <a:r>
-              <a:rPr lang="fr-FR" smtClean="0"/>
+              <a:rPr lang="fr-FR"/>
               <a:t>Modifiez les styles du texte du masque</a:t>
             </a:r>
           </a:p>
@@ -2582,7 +2587,7 @@
           <a:p>
             <a:pPr lvl="0"/>
             <a:r>
-              <a:rPr lang="fr-FR" smtClean="0"/>
+              <a:rPr lang="fr-FR"/>
               <a:t>Modifiez les styles du texte du masque</a:t>
             </a:r>
           </a:p>
@@ -2660,7 +2665,7 @@
           </a:lstStyle>
           <a:p>
             <a:r>
-              <a:rPr lang="fr-FR" smtClean="0"/>
+              <a:rPr lang="fr-FR"/>
               <a:t>Cliquez sur l'icône pour ajouter une image</a:t>
             </a:r>
             <a:endParaRPr lang="en-US" dirty="0"/>
@@ -2728,7 +2733,7 @@
           <a:p>
             <a:pPr lvl="0"/>
             <a:r>
-              <a:rPr lang="fr-FR" smtClean="0"/>
+              <a:rPr lang="fr-FR"/>
               <a:t>Modifiez les styles du texte du masque</a:t>
             </a:r>
           </a:p>
@@ -2829,7 +2834,7 @@
           <a:p>
             <a:fld id="{4509A250-FF31-4206-8172-F9D3106AACB1}" type="datetimeFigureOut">
               <a:rPr lang="en-US" dirty="0"/>
-              <a:t>3/1/2024</a:t>
+              <a:t>3/26/2024</a:t>
             </a:fld>
             <a:endParaRPr lang="en-US" dirty="0"/>
           </a:p>
@@ -2918,7 +2923,7 @@
           <a:lstStyle/>
           <a:p>
             <a:r>
-              <a:rPr lang="fr-FR" smtClean="0"/>
+              <a:rPr lang="fr-FR"/>
               <a:t>Modifiez le style du titre</a:t>
             </a:r>
             <a:endParaRPr lang="en-US" dirty="0"/>
@@ -2942,35 +2947,35 @@
           <a:p>
             <a:pPr lvl="0"/>
             <a:r>
-              <a:rPr lang="fr-FR" smtClean="0"/>
+              <a:rPr lang="fr-FR"/>
               <a:t>Modifiez les styles du texte du masque</a:t>
             </a:r>
           </a:p>
           <a:p>
             <a:pPr lvl="1"/>
             <a:r>
-              <a:rPr lang="fr-FR" smtClean="0"/>
+              <a:rPr lang="fr-FR"/>
               <a:t>Deuxième niveau</a:t>
             </a:r>
           </a:p>
           <a:p>
             <a:pPr lvl="2"/>
             <a:r>
-              <a:rPr lang="fr-FR" smtClean="0"/>
+              <a:rPr lang="fr-FR"/>
               <a:t>Troisième niveau</a:t>
             </a:r>
           </a:p>
           <a:p>
             <a:pPr lvl="3"/>
             <a:r>
-              <a:rPr lang="fr-FR" smtClean="0"/>
+              <a:rPr lang="fr-FR"/>
               <a:t>Quatrième niveau</a:t>
             </a:r>
           </a:p>
           <a:p>
             <a:pPr lvl="4"/>
             <a:r>
-              <a:rPr lang="fr-FR" smtClean="0"/>
+              <a:rPr lang="fr-FR"/>
               <a:t>Cinquième niveau</a:t>
             </a:r>
             <a:endParaRPr lang="en-US" dirty="0"/>
@@ -2994,7 +2999,7 @@
           <a:p>
             <a:fld id="{4509A250-FF31-4206-8172-F9D3106AACB1}" type="datetimeFigureOut">
               <a:rPr lang="en-US" dirty="0"/>
-              <a:t>3/1/2024</a:t>
+              <a:t>3/26/2024</a:t>
             </a:fld>
             <a:endParaRPr lang="en-US" dirty="0"/>
           </a:p>
@@ -3088,7 +3093,7 @@
           <a:lstStyle/>
           <a:p>
             <a:r>
-              <a:rPr lang="fr-FR" smtClean="0"/>
+              <a:rPr lang="fr-FR"/>
               <a:t>Modifiez le style du titre</a:t>
             </a:r>
             <a:endParaRPr lang="en-US" dirty="0"/>
@@ -3117,35 +3122,35 @@
           <a:p>
             <a:pPr lvl="0"/>
             <a:r>
-              <a:rPr lang="fr-FR" smtClean="0"/>
+              <a:rPr lang="fr-FR"/>
               <a:t>Modifiez les styles du texte du masque</a:t>
             </a:r>
           </a:p>
           <a:p>
             <a:pPr lvl="1"/>
             <a:r>
-              <a:rPr lang="fr-FR" smtClean="0"/>
+              <a:rPr lang="fr-FR"/>
               <a:t>Deuxième niveau</a:t>
             </a:r>
           </a:p>
           <a:p>
             <a:pPr lvl="2"/>
             <a:r>
-              <a:rPr lang="fr-FR" smtClean="0"/>
+              <a:rPr lang="fr-FR"/>
               <a:t>Troisième niveau</a:t>
             </a:r>
           </a:p>
           <a:p>
             <a:pPr lvl="3"/>
             <a:r>
-              <a:rPr lang="fr-FR" smtClean="0"/>
+              <a:rPr lang="fr-FR"/>
               <a:t>Quatrième niveau</a:t>
             </a:r>
           </a:p>
           <a:p>
             <a:pPr lvl="4"/>
             <a:r>
-              <a:rPr lang="fr-FR" smtClean="0"/>
+              <a:rPr lang="fr-FR"/>
               <a:t>Cinquième niveau</a:t>
             </a:r>
             <a:endParaRPr lang="en-US" dirty="0"/>
@@ -3169,7 +3174,7 @@
           <a:p>
             <a:fld id="{4509A250-FF31-4206-8172-F9D3106AACB1}" type="datetimeFigureOut">
               <a:rPr lang="en-US" dirty="0"/>
-              <a:t>3/1/2024</a:t>
+              <a:t>3/26/2024</a:t>
             </a:fld>
             <a:endParaRPr lang="en-US" dirty="0"/>
           </a:p>
@@ -3258,7 +3263,7 @@
           <a:lstStyle/>
           <a:p>
             <a:r>
-              <a:rPr lang="fr-FR" smtClean="0"/>
+              <a:rPr lang="fr-FR"/>
               <a:t>Modifiez le style du titre</a:t>
             </a:r>
             <a:endParaRPr lang="en-US" dirty="0"/>
@@ -3282,35 +3287,35 @@
           <a:p>
             <a:pPr lvl="0"/>
             <a:r>
-              <a:rPr lang="fr-FR" smtClean="0"/>
+              <a:rPr lang="fr-FR"/>
               <a:t>Modifiez les styles du texte du masque</a:t>
             </a:r>
           </a:p>
           <a:p>
             <a:pPr lvl="1"/>
             <a:r>
-              <a:rPr lang="fr-FR" smtClean="0"/>
+              <a:rPr lang="fr-FR"/>
               <a:t>Deuxième niveau</a:t>
             </a:r>
           </a:p>
           <a:p>
             <a:pPr lvl="2"/>
             <a:r>
-              <a:rPr lang="fr-FR" smtClean="0"/>
+              <a:rPr lang="fr-FR"/>
               <a:t>Troisième niveau</a:t>
             </a:r>
           </a:p>
           <a:p>
             <a:pPr lvl="3"/>
             <a:r>
-              <a:rPr lang="fr-FR" smtClean="0"/>
+              <a:rPr lang="fr-FR"/>
               <a:t>Quatrième niveau</a:t>
             </a:r>
           </a:p>
           <a:p>
             <a:pPr lvl="4"/>
             <a:r>
-              <a:rPr lang="fr-FR" smtClean="0"/>
+              <a:rPr lang="fr-FR"/>
               <a:t>Cinquième niveau</a:t>
             </a:r>
             <a:endParaRPr lang="en-US" dirty="0"/>
@@ -3334,7 +3339,7 @@
           <a:p>
             <a:fld id="{4509A250-FF31-4206-8172-F9D3106AACB1}" type="datetimeFigureOut">
               <a:rPr lang="en-US" dirty="0"/>
-              <a:t>3/1/2024</a:t>
+              <a:t>3/26/2024</a:t>
             </a:fld>
             <a:endParaRPr lang="en-US" dirty="0"/>
           </a:p>
@@ -3432,7 +3437,7 @@
           </a:lstStyle>
           <a:p>
             <a:r>
-              <a:rPr lang="fr-FR" smtClean="0"/>
+              <a:rPr lang="fr-FR"/>
               <a:t>Modifiez le style du titre</a:t>
             </a:r>
             <a:endParaRPr lang="en-US" dirty="0"/>
@@ -3553,7 +3558,7 @@
           <a:p>
             <a:pPr lvl="0"/>
             <a:r>
-              <a:rPr lang="fr-FR" smtClean="0"/>
+              <a:rPr lang="fr-FR"/>
               <a:t>Modifiez les styles du texte du masque</a:t>
             </a:r>
           </a:p>
@@ -3576,7 +3581,7 @@
           <a:p>
             <a:fld id="{9796027F-7875-4030-9381-8BD8C4F21935}" type="datetimeFigureOut">
               <a:rPr lang="en-US" dirty="0"/>
-              <a:t>3/1/2024</a:t>
+              <a:t>3/26/2024</a:t>
             </a:fld>
             <a:endParaRPr lang="en-US" dirty="0"/>
           </a:p>
@@ -3665,7 +3670,7 @@
           <a:lstStyle/>
           <a:p>
             <a:r>
-              <a:rPr lang="fr-FR" smtClean="0"/>
+              <a:rPr lang="fr-FR"/>
               <a:t>Modifiez le style du titre</a:t>
             </a:r>
             <a:endParaRPr lang="en-US" dirty="0"/>
@@ -3724,35 +3729,35 @@
           <a:p>
             <a:pPr lvl="0"/>
             <a:r>
-              <a:rPr lang="fr-FR" smtClean="0"/>
+              <a:rPr lang="fr-FR"/>
               <a:t>Modifiez les styles du texte du masque</a:t>
             </a:r>
           </a:p>
           <a:p>
             <a:pPr lvl="1"/>
             <a:r>
-              <a:rPr lang="fr-FR" smtClean="0"/>
+              <a:rPr lang="fr-FR"/>
               <a:t>Deuxième niveau</a:t>
             </a:r>
           </a:p>
           <a:p>
             <a:pPr lvl="2"/>
             <a:r>
-              <a:rPr lang="fr-FR" smtClean="0"/>
+              <a:rPr lang="fr-FR"/>
               <a:t>Troisième niveau</a:t>
             </a:r>
           </a:p>
           <a:p>
             <a:pPr lvl="3"/>
             <a:r>
-              <a:rPr lang="fr-FR" smtClean="0"/>
+              <a:rPr lang="fr-FR"/>
               <a:t>Quatrième niveau</a:t>
             </a:r>
           </a:p>
           <a:p>
             <a:pPr lvl="4"/>
             <a:r>
-              <a:rPr lang="fr-FR" smtClean="0"/>
+              <a:rPr lang="fr-FR"/>
               <a:t>Cinquième niveau</a:t>
             </a:r>
             <a:endParaRPr lang="en-US" dirty="0"/>
@@ -3811,35 +3816,35 @@
           <a:p>
             <a:pPr lvl="0"/>
             <a:r>
-              <a:rPr lang="fr-FR" smtClean="0"/>
+              <a:rPr lang="fr-FR"/>
               <a:t>Modifiez les styles du texte du masque</a:t>
             </a:r>
           </a:p>
           <a:p>
             <a:pPr lvl="1"/>
             <a:r>
-              <a:rPr lang="fr-FR" smtClean="0"/>
+              <a:rPr lang="fr-FR"/>
               <a:t>Deuxième niveau</a:t>
             </a:r>
           </a:p>
           <a:p>
             <a:pPr lvl="2"/>
             <a:r>
-              <a:rPr lang="fr-FR" smtClean="0"/>
+              <a:rPr lang="fr-FR"/>
               <a:t>Troisième niveau</a:t>
             </a:r>
           </a:p>
           <a:p>
             <a:pPr lvl="3"/>
             <a:r>
-              <a:rPr lang="fr-FR" smtClean="0"/>
+              <a:rPr lang="fr-FR"/>
               <a:t>Quatrième niveau</a:t>
             </a:r>
           </a:p>
           <a:p>
             <a:pPr lvl="4"/>
             <a:r>
-              <a:rPr lang="fr-FR" smtClean="0"/>
+              <a:rPr lang="fr-FR"/>
               <a:t>Cinquième niveau</a:t>
             </a:r>
             <a:endParaRPr lang="en-US" dirty="0"/>
@@ -3863,7 +3868,7 @@
           <a:p>
             <a:fld id="{9796027F-7875-4030-9381-8BD8C4F21935}" type="datetimeFigureOut">
               <a:rPr lang="en-US" dirty="0"/>
-              <a:t>3/1/2024</a:t>
+              <a:t>3/26/2024</a:t>
             </a:fld>
             <a:endParaRPr lang="en-US" dirty="0"/>
           </a:p>
@@ -3956,7 +3961,7 @@
           </a:lstStyle>
           <a:p>
             <a:r>
-              <a:rPr lang="fr-FR" smtClean="0"/>
+              <a:rPr lang="fr-FR"/>
               <a:t>Modifiez le style du titre</a:t>
             </a:r>
             <a:endParaRPr lang="en-US" dirty="0"/>
@@ -4031,7 +4036,7 @@
           <a:p>
             <a:pPr lvl="0"/>
             <a:r>
-              <a:rPr lang="fr-FR" smtClean="0"/>
+              <a:rPr lang="fr-FR"/>
               <a:t>Modifiez les styles du texte du masque</a:t>
             </a:r>
           </a:p>
@@ -4089,35 +4094,35 @@
           <a:p>
             <a:pPr lvl="0"/>
             <a:r>
-              <a:rPr lang="fr-FR" smtClean="0"/>
+              <a:rPr lang="fr-FR"/>
               <a:t>Modifiez les styles du texte du masque</a:t>
             </a:r>
           </a:p>
           <a:p>
             <a:pPr lvl="1"/>
             <a:r>
-              <a:rPr lang="fr-FR" smtClean="0"/>
+              <a:rPr lang="fr-FR"/>
               <a:t>Deuxième niveau</a:t>
             </a:r>
           </a:p>
           <a:p>
             <a:pPr lvl="2"/>
             <a:r>
-              <a:rPr lang="fr-FR" smtClean="0"/>
+              <a:rPr lang="fr-FR"/>
               <a:t>Troisième niveau</a:t>
             </a:r>
           </a:p>
           <a:p>
             <a:pPr lvl="3"/>
             <a:r>
-              <a:rPr lang="fr-FR" smtClean="0"/>
+              <a:rPr lang="fr-FR"/>
               <a:t>Quatrième niveau</a:t>
             </a:r>
           </a:p>
           <a:p>
             <a:pPr lvl="4"/>
             <a:r>
-              <a:rPr lang="fr-FR" smtClean="0"/>
+              <a:rPr lang="fr-FR"/>
               <a:t>Cinquième niveau</a:t>
             </a:r>
             <a:endParaRPr lang="en-US" dirty="0"/>
@@ -4192,7 +4197,7 @@
           <a:p>
             <a:pPr lvl="0"/>
             <a:r>
-              <a:rPr lang="fr-FR" smtClean="0"/>
+              <a:rPr lang="fr-FR"/>
               <a:t>Modifiez les styles du texte du masque</a:t>
             </a:r>
           </a:p>
@@ -4250,35 +4255,35 @@
           <a:p>
             <a:pPr lvl="0"/>
             <a:r>
-              <a:rPr lang="fr-FR" smtClean="0"/>
+              <a:rPr lang="fr-FR"/>
               <a:t>Modifiez les styles du texte du masque</a:t>
             </a:r>
           </a:p>
           <a:p>
             <a:pPr lvl="1"/>
             <a:r>
-              <a:rPr lang="fr-FR" smtClean="0"/>
+              <a:rPr lang="fr-FR"/>
               <a:t>Deuxième niveau</a:t>
             </a:r>
           </a:p>
           <a:p>
             <a:pPr lvl="2"/>
             <a:r>
-              <a:rPr lang="fr-FR" smtClean="0"/>
+              <a:rPr lang="fr-FR"/>
               <a:t>Troisième niveau</a:t>
             </a:r>
           </a:p>
           <a:p>
             <a:pPr lvl="3"/>
             <a:r>
-              <a:rPr lang="fr-FR" smtClean="0"/>
+              <a:rPr lang="fr-FR"/>
               <a:t>Quatrième niveau</a:t>
             </a:r>
           </a:p>
           <a:p>
             <a:pPr lvl="4"/>
             <a:r>
-              <a:rPr lang="fr-FR" smtClean="0"/>
+              <a:rPr lang="fr-FR"/>
               <a:t>Cinquième niveau</a:t>
             </a:r>
             <a:endParaRPr lang="en-US" dirty="0"/>
@@ -4302,7 +4307,7 @@
           <a:p>
             <a:fld id="{9796027F-7875-4030-9381-8BD8C4F21935}" type="datetimeFigureOut">
               <a:rPr lang="en-US" dirty="0"/>
-              <a:t>3/1/2024</a:t>
+              <a:t>3/26/2024</a:t>
             </a:fld>
             <a:endParaRPr lang="en-US" dirty="0"/>
           </a:p>
@@ -4391,7 +4396,7 @@
           <a:lstStyle/>
           <a:p>
             <a:r>
-              <a:rPr lang="fr-FR" smtClean="0"/>
+              <a:rPr lang="fr-FR"/>
               <a:t>Modifiez le style du titre</a:t>
             </a:r>
             <a:endParaRPr lang="en-US" dirty="0"/>
@@ -4415,7 +4420,7 @@
           <a:p>
             <a:fld id="{4509A250-FF31-4206-8172-F9D3106AACB1}" type="datetimeFigureOut">
               <a:rPr lang="en-US" dirty="0"/>
-              <a:t>3/1/2024</a:t>
+              <a:t>3/26/2024</a:t>
             </a:fld>
             <a:endParaRPr lang="en-US" dirty="0"/>
           </a:p>
@@ -4505,7 +4510,7 @@
           <a:p>
             <a:fld id="{4509A250-FF31-4206-8172-F9D3106AACB1}" type="datetimeFigureOut">
               <a:rPr lang="en-US" dirty="0"/>
-              <a:t>3/1/2024</a:t>
+              <a:t>3/26/2024</a:t>
             </a:fld>
             <a:endParaRPr lang="en-US" dirty="0"/>
           </a:p>
@@ -4603,7 +4608,7 @@
           </a:lstStyle>
           <a:p>
             <a:r>
-              <a:rPr lang="fr-FR" smtClean="0"/>
+              <a:rPr lang="fr-FR"/>
               <a:t>Modifiez le style du titre</a:t>
             </a:r>
             <a:endParaRPr lang="en-US" dirty="0"/>
@@ -4662,35 +4667,35 @@
           <a:p>
             <a:pPr lvl="0"/>
             <a:r>
-              <a:rPr lang="fr-FR" smtClean="0"/>
+              <a:rPr lang="fr-FR"/>
               <a:t>Modifiez les styles du texte du masque</a:t>
             </a:r>
           </a:p>
           <a:p>
             <a:pPr lvl="1"/>
             <a:r>
-              <a:rPr lang="fr-FR" smtClean="0"/>
+              <a:rPr lang="fr-FR"/>
               <a:t>Deuxième niveau</a:t>
             </a:r>
           </a:p>
           <a:p>
             <a:pPr lvl="2"/>
             <a:r>
-              <a:rPr lang="fr-FR" smtClean="0"/>
+              <a:rPr lang="fr-FR"/>
               <a:t>Troisième niveau</a:t>
             </a:r>
           </a:p>
           <a:p>
             <a:pPr lvl="3"/>
             <a:r>
-              <a:rPr lang="fr-FR" smtClean="0"/>
+              <a:rPr lang="fr-FR"/>
               <a:t>Quatrième niveau</a:t>
             </a:r>
           </a:p>
           <a:p>
             <a:pPr lvl="4"/>
             <a:r>
-              <a:rPr lang="fr-FR" smtClean="0"/>
+              <a:rPr lang="fr-FR"/>
               <a:t>Cinquième niveau</a:t>
             </a:r>
             <a:endParaRPr lang="en-US" dirty="0"/>
@@ -4756,7 +4761,7 @@
           <a:p>
             <a:pPr lvl="0"/>
             <a:r>
-              <a:rPr lang="fr-FR" smtClean="0"/>
+              <a:rPr lang="fr-FR"/>
               <a:t>Modifiez les styles du texte du masque</a:t>
             </a:r>
           </a:p>
@@ -4779,7 +4784,7 @@
           <a:p>
             <a:fld id="{4509A250-FF31-4206-8172-F9D3106AACB1}" type="datetimeFigureOut">
               <a:rPr lang="en-US" dirty="0"/>
-              <a:t>3/1/2024</a:t>
+              <a:t>3/26/2024</a:t>
             </a:fld>
             <a:endParaRPr lang="en-US" dirty="0"/>
           </a:p>
@@ -4879,7 +4884,7 @@
           </a:lstStyle>
           <a:p>
             <a:r>
-              <a:rPr lang="fr-FR" smtClean="0"/>
+              <a:rPr lang="fr-FR"/>
               <a:t>Modifiez le style du titre</a:t>
             </a:r>
             <a:endParaRPr lang="en-US" dirty="0"/>
@@ -4958,7 +4963,7 @@
           </a:lstStyle>
           <a:p>
             <a:r>
-              <a:rPr lang="fr-FR" smtClean="0"/>
+              <a:rPr lang="fr-FR"/>
               <a:t>Cliquez sur l'icône pour ajouter une image</a:t>
             </a:r>
             <a:endParaRPr lang="en-US" dirty="0"/>
@@ -5026,7 +5031,7 @@
           <a:p>
             <a:pPr lvl="0"/>
             <a:r>
-              <a:rPr lang="fr-FR" smtClean="0"/>
+              <a:rPr lang="fr-FR"/>
               <a:t>Modifiez les styles du texte du masque</a:t>
             </a:r>
           </a:p>
@@ -5049,7 +5054,7 @@
           <a:p>
             <a:fld id="{4509A250-FF31-4206-8172-F9D3106AACB1}" type="datetimeFigureOut">
               <a:rPr lang="en-US" dirty="0"/>
-              <a:t>3/1/2024</a:t>
+              <a:t>3/26/2024</a:t>
             </a:fld>
             <a:endParaRPr lang="en-US" dirty="0"/>
           </a:p>
@@ -5368,7 +5373,7 @@
           <a:lstStyle/>
           <a:p>
             <a:r>
-              <a:rPr lang="fr-FR" smtClean="0"/>
+              <a:rPr lang="fr-FR"/>
               <a:t>Modifiez le style du titre</a:t>
             </a:r>
             <a:endParaRPr lang="en-US" dirty="0"/>
@@ -5402,35 +5407,35 @@
           <a:p>
             <a:pPr lvl="0"/>
             <a:r>
-              <a:rPr lang="fr-FR" smtClean="0"/>
+              <a:rPr lang="fr-FR"/>
               <a:t>Modifiez les styles du texte du masque</a:t>
             </a:r>
           </a:p>
           <a:p>
             <a:pPr lvl="1"/>
             <a:r>
-              <a:rPr lang="fr-FR" smtClean="0"/>
+              <a:rPr lang="fr-FR"/>
               <a:t>Deuxième niveau</a:t>
             </a:r>
           </a:p>
           <a:p>
             <a:pPr lvl="2"/>
             <a:r>
-              <a:rPr lang="fr-FR" smtClean="0"/>
+              <a:rPr lang="fr-FR"/>
               <a:t>Troisième niveau</a:t>
             </a:r>
           </a:p>
           <a:p>
             <a:pPr lvl="3"/>
             <a:r>
-              <a:rPr lang="fr-FR" smtClean="0"/>
+              <a:rPr lang="fr-FR"/>
               <a:t>Quatrième niveau</a:t>
             </a:r>
           </a:p>
           <a:p>
             <a:pPr lvl="4"/>
             <a:r>
-              <a:rPr lang="fr-FR" smtClean="0"/>
+              <a:rPr lang="fr-FR"/>
               <a:t>Cinquième niveau</a:t>
             </a:r>
             <a:endParaRPr lang="en-US" dirty="0"/>
@@ -5473,7 +5478,7 @@
           <a:p>
             <a:fld id="{4AAD347D-5ACD-4C99-B74B-A9C85AD731AF}" type="datetimeFigureOut">
               <a:rPr lang="en-US" dirty="0"/>
-              <a:t>3/1/2024</a:t>
+              <a:t>3/26/2024</a:t>
             </a:fld>
             <a:endParaRPr lang="en-US" dirty="0"/>
           </a:p>
@@ -6031,7 +6036,7 @@
           <a:lstStyle/>
           <a:p>
             <a:pPr algn="ctr"/>
-            <a:endParaRPr lang="fr-FR" dirty="0" smtClean="0"/>
+            <a:endParaRPr lang="fr-FR" dirty="0"/>
           </a:p>
           <a:p>
             <a:pPr algn="ctr"/>
@@ -6039,7 +6044,7 @@
           </a:p>
           <a:p>
             <a:pPr algn="ctr"/>
-            <a:endParaRPr lang="fr-FR" dirty="0" smtClean="0"/>
+            <a:endParaRPr lang="fr-FR" dirty="0"/>
           </a:p>
           <a:p>
             <a:pPr algn="ctr"/>
@@ -6047,7 +6052,7 @@
           </a:p>
           <a:p>
             <a:pPr algn="ctr"/>
-            <a:endParaRPr lang="fr-FR" dirty="0" smtClean="0"/>
+            <a:endParaRPr lang="fr-FR" dirty="0"/>
           </a:p>
           <a:p>
             <a:pPr algn="ctr"/>
@@ -6055,7 +6060,7 @@
           </a:p>
           <a:p>
             <a:pPr algn="ctr"/>
-            <a:endParaRPr lang="fr-FR" dirty="0" smtClean="0"/>
+            <a:endParaRPr lang="fr-FR" dirty="0"/>
           </a:p>
           <a:p>
             <a:pPr algn="ctr"/>
@@ -6063,7 +6068,7 @@
           </a:p>
           <a:p>
             <a:pPr algn="ctr"/>
-            <a:endParaRPr lang="fr-FR" dirty="0" smtClean="0"/>
+            <a:endParaRPr lang="fr-FR" dirty="0"/>
           </a:p>
           <a:p>
             <a:pPr algn="ctr"/>
@@ -6071,7 +6076,7 @@
           </a:p>
           <a:p>
             <a:pPr algn="ctr"/>
-            <a:endParaRPr lang="fr-FR" dirty="0" smtClean="0"/>
+            <a:endParaRPr lang="fr-FR" dirty="0"/>
           </a:p>
           <a:p>
             <a:pPr algn="ctr"/>
@@ -6079,15 +6084,14 @@
           </a:p>
           <a:p>
             <a:pPr algn="ctr"/>
-            <a:endParaRPr lang="fr-FR" dirty="0" smtClean="0"/>
+            <a:endParaRPr lang="fr-FR" dirty="0"/>
           </a:p>
           <a:p>
             <a:pPr algn="ctr"/>
             <a:r>
-              <a:rPr lang="fr-FR" dirty="0" smtClean="0"/>
+              <a:rPr lang="fr-FR" dirty="0"/>
               <a:t>Nom de l’acteur</a:t>
             </a:r>
-            <a:endParaRPr lang="fr-FR" dirty="0"/>
           </a:p>
         </p:txBody>
       </p:sp>
@@ -6134,10 +6138,9 @@
           <a:p>
             <a:pPr algn="ctr"/>
             <a:r>
-              <a:rPr lang="fr-FR" dirty="0" smtClean="0"/>
+              <a:rPr lang="fr-FR" dirty="0"/>
               <a:t>Photo de l’acteur</a:t>
             </a:r>
-            <a:endParaRPr lang="fr-FR" dirty="0"/>
           </a:p>
         </p:txBody>
       </p:sp>
@@ -6286,10 +6289,9 @@
           <a:p>
             <a:pPr algn="ctr"/>
             <a:r>
-              <a:rPr lang="fr-FR" sz="1600" dirty="0" smtClean="0"/>
-              <a:t>Découvrez les  visages qui donnent vie à nos productions exceptionnelles. Chaque acteur de la compagnie DreamGlow Théâtre apporte une passion unique et un talent artistique qui enrichissent nos performances. Explorez cette galerie de portraits et apprenez à connaître les membres de notre équipe qui captive le public à chaque représentation.</a:t>
-            </a:r>
-            <a:endParaRPr lang="fr-FR" sz="1600" dirty="0"/>
+              <a:rPr lang="fr-FR" sz="1600" dirty="0"/>
+              <a:t>Découvrez les  visages qui donnent vie à nos productions exceptionnelles. Chaque équipe de la compagnie DreamGlow Théâtre apporte une passion unique et un talent artistique qui enrichissent nos performances. Explorez cette galerie de portraits et apprenez à connaître les membres de notre équipe qui captive le public à chaque représentation.</a:t>
+            </a:r>
           </a:p>
         </p:txBody>
       </p:sp>

</xml_diff>